<commit_message>
Add lime analysis png
</commit_message>
<xml_diff>
--- a/presentations/Koncowa Prezentacja - Przewidywanie hepatoksycznosci - Dawid Szczerba - Copy.pptx
+++ b/presentations/Koncowa Prezentacja - Przewidywanie hepatoksycznosci - Dawid Szczerba - Copy.pptx
@@ -210,7 +210,7 @@
           <a:p>
             <a:fld id="{BE94E56B-98DA-4F91-9ADC-FA6827D46689}" type="datetimeFigureOut">
               <a:rPr lang="pl-PL" smtClean="0"/>
-              <a:t>23.01.2022</a:t>
+              <a:t>24.01.2022</a:t>
             </a:fld>
             <a:endParaRPr lang="pl-PL"/>
           </a:p>
@@ -1529,7 +1529,7 @@
           <a:p>
             <a:fld id="{9B5CE6F7-C4EC-48B7-8BA2-B9C971C53599}" type="datetimeFigureOut">
               <a:rPr lang="pl-PL" smtClean="0"/>
-              <a:t>23.01.2022</a:t>
+              <a:t>24.01.2022</a:t>
             </a:fld>
             <a:endParaRPr lang="pl-PL"/>
           </a:p>
@@ -1740,7 +1740,7 @@
           <a:p>
             <a:fld id="{9B5CE6F7-C4EC-48B7-8BA2-B9C971C53599}" type="datetimeFigureOut">
               <a:rPr lang="pl-PL" smtClean="0"/>
-              <a:t>23.01.2022</a:t>
+              <a:t>24.01.2022</a:t>
             </a:fld>
             <a:endParaRPr lang="pl-PL"/>
           </a:p>
@@ -1955,7 +1955,7 @@
           <a:p>
             <a:fld id="{9B5CE6F7-C4EC-48B7-8BA2-B9C971C53599}" type="datetimeFigureOut">
               <a:rPr lang="pl-PL" smtClean="0"/>
-              <a:t>23.01.2022</a:t>
+              <a:t>24.01.2022</a:t>
             </a:fld>
             <a:endParaRPr lang="pl-PL"/>
           </a:p>
@@ -2156,7 +2156,7 @@
           <a:p>
             <a:fld id="{9B5CE6F7-C4EC-48B7-8BA2-B9C971C53599}" type="datetimeFigureOut">
               <a:rPr lang="pl-PL" smtClean="0"/>
-              <a:t>23.01.2022</a:t>
+              <a:t>24.01.2022</a:t>
             </a:fld>
             <a:endParaRPr lang="pl-PL"/>
           </a:p>
@@ -2435,7 +2435,7 @@
           <a:p>
             <a:fld id="{9B5CE6F7-C4EC-48B7-8BA2-B9C971C53599}" type="datetimeFigureOut">
               <a:rPr lang="pl-PL" smtClean="0"/>
-              <a:t>23.01.2022</a:t>
+              <a:t>24.01.2022</a:t>
             </a:fld>
             <a:endParaRPr lang="pl-PL"/>
           </a:p>
@@ -2703,7 +2703,7 @@
           <a:p>
             <a:fld id="{9B5CE6F7-C4EC-48B7-8BA2-B9C971C53599}" type="datetimeFigureOut">
               <a:rPr lang="pl-PL" smtClean="0"/>
-              <a:t>23.01.2022</a:t>
+              <a:t>24.01.2022</a:t>
             </a:fld>
             <a:endParaRPr lang="pl-PL"/>
           </a:p>
@@ -3119,7 +3119,7 @@
           <a:p>
             <a:fld id="{9B5CE6F7-C4EC-48B7-8BA2-B9C971C53599}" type="datetimeFigureOut">
               <a:rPr lang="pl-PL" smtClean="0"/>
-              <a:t>23.01.2022</a:t>
+              <a:t>24.01.2022</a:t>
             </a:fld>
             <a:endParaRPr lang="pl-PL"/>
           </a:p>
@@ -3268,7 +3268,7 @@
           <a:p>
             <a:fld id="{9B5CE6F7-C4EC-48B7-8BA2-B9C971C53599}" type="datetimeFigureOut">
               <a:rPr lang="pl-PL" smtClean="0"/>
-              <a:t>23.01.2022</a:t>
+              <a:t>24.01.2022</a:t>
             </a:fld>
             <a:endParaRPr lang="pl-PL"/>
           </a:p>
@@ -3394,7 +3394,7 @@
           <a:p>
             <a:fld id="{9B5CE6F7-C4EC-48B7-8BA2-B9C971C53599}" type="datetimeFigureOut">
               <a:rPr lang="pl-PL" smtClean="0"/>
-              <a:t>23.01.2022</a:t>
+              <a:t>24.01.2022</a:t>
             </a:fld>
             <a:endParaRPr lang="pl-PL"/>
           </a:p>
@@ -3645,7 +3645,7 @@
           <a:p>
             <a:fld id="{9B5CE6F7-C4EC-48B7-8BA2-B9C971C53599}" type="datetimeFigureOut">
               <a:rPr lang="pl-PL" smtClean="0"/>
-              <a:t>23.01.2022</a:t>
+              <a:t>24.01.2022</a:t>
             </a:fld>
             <a:endParaRPr lang="pl-PL"/>
           </a:p>
@@ -4090,7 +4090,7 @@
           <a:p>
             <a:fld id="{9B5CE6F7-C4EC-48B7-8BA2-B9C971C53599}" type="datetimeFigureOut">
               <a:rPr lang="pl-PL" smtClean="0"/>
-              <a:t>23.01.2022</a:t>
+              <a:t>24.01.2022</a:t>
             </a:fld>
             <a:endParaRPr lang="pl-PL"/>
           </a:p>
@@ -4417,7 +4417,7 @@
           <a:p>
             <a:fld id="{9B5CE6F7-C4EC-48B7-8BA2-B9C971C53599}" type="datetimeFigureOut">
               <a:rPr lang="pl-PL" smtClean="0"/>
-              <a:t>23.01.2022</a:t>
+              <a:t>24.01.2022</a:t>
             </a:fld>
             <a:endParaRPr lang="pl-PL"/>
           </a:p>
@@ -6977,8 +6977,8 @@
         </p:nvSpPr>
         <p:spPr>
           <a:xfrm>
-            <a:off x="1452616" y="962902"/>
-            <a:ext cx="4176384" cy="2380828"/>
+            <a:off x="1452615" y="962902"/>
+            <a:ext cx="4830197" cy="2380828"/>
           </a:xfrm>
         </p:spPr>
         <p:txBody>
@@ -6988,7 +6988,7 @@
           <a:lstStyle/>
           <a:p>
             <a:r>
-              <a:rPr lang="en-US" sz="4800"/>
+              <a:rPr lang="en-US" sz="4800" dirty="0"/>
               <a:t>ANALIZA WYNIKU - LIME </a:t>
             </a:r>
           </a:p>
@@ -9765,8 +9765,8 @@
           </a:p>
         </p:txBody>
       </p:sp>
-      <mc:AlternateContent xmlns:mc="http://schemas.openxmlformats.org/markup-compatibility/2006">
-        <mc:Choice xmlns:a14="http://schemas.microsoft.com/office/drawing/2010/main" Requires="a14">
+      <mc:AlternateContent xmlns:mc="http://schemas.openxmlformats.org/markup-compatibility/2006" xmlns:a14="http://schemas.microsoft.com/office/drawing/2010/main">
+        <mc:Choice Requires="a14">
           <p:sp>
             <p:nvSpPr>
               <p:cNvPr id="3" name="Symbol zastępczy zawartości 2">
@@ -9883,7 +9883,7 @@
             </p:txBody>
           </p:sp>
         </mc:Choice>
-        <mc:Fallback>
+        <mc:Fallback xmlns="">
           <p:sp>
             <p:nvSpPr>
               <p:cNvPr id="3" name="Symbol zastępczy zawartości 2">

</xml_diff>